<commit_message>
review and refine forecasts presenting trends to smokefree target year + 10 years
</commit_message>
<xml_diff>
--- a/transition_probability_estimates/smoking_transitions_England.pptx
+++ b/transition_probability_estimates/smoking_transitions_England.pptx
@@ -13,6 +13,7 @@
     <p:sldId id="261" r:id="rId7"/>
     <p:sldId id="262" r:id="rId8"/>
     <p:sldId id="263" r:id="rId9"/>
+    <p:sldId id="264" r:id="rId10"/>
   </p:sldIdLst>
   <p:sldSz cx="9144000" cy="5143500" type="screen16x9"/>
   <p:notesSz cx="6858000" cy="9144000"/>
@@ -3175,7 +3176,7 @@
             </a:pPr>
             <a:r>
               <a:rPr/>
-              <a:t>24 March 2023</a:t>
+              <a:t>26 October 2023</a:t>
             </a:r>
           </a:p>
         </p:txBody>
@@ -3186,6 +3187,127 @@
 </file>
 
 <file path=ppt/slides/slide2.xml><?xml version="1.0" encoding="utf-8"?>
+<p:sld xmlns:a="http://schemas.openxmlformats.org/drawingml/2006/main" xmlns:r="http://schemas.openxmlformats.org/officeDocument/2006/relationships" xmlns:p="http://schemas.openxmlformats.org/presentationml/2006/main">
+  <p:cSld>
+    <p:spTree>
+      <p:nvGrpSpPr>
+        <p:cNvPr id="1" name=""/>
+        <p:cNvGrpSpPr/>
+        <p:nvPr/>
+      </p:nvGrpSpPr>
+      <p:grpSpPr>
+        <a:xfrm>
+          <a:off x="0" y="0"/>
+          <a:ext cx="0" cy="0"/>
+          <a:chOff x="0" y="0"/>
+          <a:chExt cx="0" cy="0"/>
+        </a:xfrm>
+      </p:grpSpPr>
+      <p:sp>
+        <p:nvSpPr>
+          <p:cNvPr id="2" name="Title 1"/>
+          <p:cNvSpPr>
+            <a:spLocks noGrp="1"/>
+          </p:cNvSpPr>
+          <p:nvPr>
+            <p:ph type="title"/>
+          </p:nvPr>
+        </p:nvSpPr>
+        <p:spPr/>
+        <p:txBody>
+          <a:bodyPr/>
+          <a:lstStyle/>
+          <a:p>
+            <a:pPr lvl="0" indent="0" marL="0">
+              <a:buNone/>
+            </a:pPr>
+            <a:r>
+              <a:rPr/>
+              <a:t>Cover sheet</a:t>
+            </a:r>
+          </a:p>
+        </p:txBody>
+      </p:sp>
+      <p:sp>
+        <p:nvSpPr>
+          <p:cNvPr id="3" name="Content Placeholder 2"/>
+          <p:cNvSpPr>
+            <a:spLocks noGrp="1"/>
+          </p:cNvSpPr>
+          <p:nvPr>
+            <p:ph idx="1"/>
+          </p:nvPr>
+        </p:nvSpPr>
+        <p:spPr/>
+        <p:txBody>
+          <a:bodyPr/>
+          <a:lstStyle/>
+          <a:p>
+            <a:pPr lvl="0" indent="0" marL="0">
+              <a:buNone/>
+            </a:pPr>
+            <a:r>
+              <a:rPr/>
+              <a:t>Smoking state transition probabilities webpage </a:t>
+            </a:r>
+            <a:r>
+              <a:rPr>
+                <a:hlinkClick r:id="rId2"/>
+              </a:rPr>
+              <a:t>https://stapm.gitlab.io/smoking_state_transitions.html</a:t>
+            </a:r>
+          </a:p>
+          <a:p>
+            <a:pPr lvl="0" indent="0" marL="0">
+              <a:buNone/>
+            </a:pPr>
+            <a:r>
+              <a:rPr/>
+              <a:t>Citation:</a:t>
+            </a:r>
+          </a:p>
+          <a:p>
+            <a:pPr lvl="0" indent="0" marL="0">
+              <a:buNone/>
+            </a:pPr>
+            <a:r>
+              <a:rPr/>
+              <a:t>Gillespie D, Webster L, Leeming G, Opazo-Breton M, Brennan A (2023). smktrans: An R Package for estimating smoking state transition probabilities from cross-sectional survey data. R package version 1.6.0. The University of Sheffield. doi: </a:t>
+            </a:r>
+            <a:r>
+              <a:rPr>
+                <a:hlinkClick r:id="rId3"/>
+              </a:rPr>
+              <a:t>https://doi.org/10.17605/OSF.IO/YGXQ9</a:t>
+            </a:r>
+            <a:r>
+              <a:rPr/>
+              <a:t>.</a:t>
+            </a:r>
+          </a:p>
+          <a:p>
+            <a:pPr lvl="0" indent="0" marL="0">
+              <a:buNone/>
+            </a:pPr>
+            <a:r>
+              <a:rPr/>
+              <a:t>Contact: </a:t>
+            </a:r>
+            <a:r>
+              <a:rPr>
+                <a:latin typeface="Courier"/>
+              </a:rPr>
+              <a:t>duncan.gillespie@sheffield.ac.uk</a:t>
+            </a:r>
+          </a:p>
+        </p:txBody>
+      </p:sp>
+    </p:spTree>
+  </p:cSld>
+</p:sld>
+</file>
+
+<file path=ppt/slides/slide3.xml><?xml version="1.0" encoding="utf-8"?>
 <p:sld xmlns:a="http://schemas.openxmlformats.org/drawingml/2006/main" xmlns:r="http://schemas.openxmlformats.org/officeDocument/2006/relationships" xmlns:p="http://schemas.openxmlformats.org/presentationml/2006/main">
   <p:cSld>
     <p:spTree>
@@ -3262,7 +3384,7 @@
 </p:sld>
 </file>
 
-<file path=ppt/slides/slide3.xml><?xml version="1.0" encoding="utf-8"?>
+<file path=ppt/slides/slide4.xml><?xml version="1.0" encoding="utf-8"?>
 <p:sld xmlns:a="http://schemas.openxmlformats.org/drawingml/2006/main" xmlns:r="http://schemas.openxmlformats.org/officeDocument/2006/relationships" xmlns:p="http://schemas.openxmlformats.org/presentationml/2006/main">
   <p:cSld>
     <p:spTree>
@@ -3314,7 +3436,7 @@
 </p:sld>
 </file>
 
-<file path=ppt/slides/slide4.xml><?xml version="1.0" encoding="utf-8"?>
+<file path=ppt/slides/slide5.xml><?xml version="1.0" encoding="utf-8"?>
 <p:sld xmlns:a="http://schemas.openxmlformats.org/drawingml/2006/main" xmlns:r="http://schemas.openxmlformats.org/officeDocument/2006/relationships" xmlns:p="http://schemas.openxmlformats.org/presentationml/2006/main">
   <p:cSld>
     <p:spTree>
@@ -3391,7 +3513,7 @@
 </p:sld>
 </file>
 
-<file path=ppt/slides/slide5.xml><?xml version="1.0" encoding="utf-8"?>
+<file path=ppt/slides/slide6.xml><?xml version="1.0" encoding="utf-8"?>
 <p:sld xmlns:a="http://schemas.openxmlformats.org/drawingml/2006/main" xmlns:r="http://schemas.openxmlformats.org/officeDocument/2006/relationships" xmlns:p="http://schemas.openxmlformats.org/presentationml/2006/main">
   <p:cSld>
     <p:spTree>
@@ -3443,7 +3565,7 @@
 </p:sld>
 </file>
 
-<file path=ppt/slides/slide6.xml><?xml version="1.0" encoding="utf-8"?>
+<file path=ppt/slides/slide7.xml><?xml version="1.0" encoding="utf-8"?>
 <p:sld xmlns:a="http://schemas.openxmlformats.org/drawingml/2006/main" xmlns:r="http://schemas.openxmlformats.org/officeDocument/2006/relationships" xmlns:p="http://schemas.openxmlformats.org/presentationml/2006/main">
   <p:cSld>
     <p:spTree>
@@ -3495,7 +3617,7 @@
 </p:sld>
 </file>
 
-<file path=ppt/slides/slide7.xml><?xml version="1.0" encoding="utf-8"?>
+<file path=ppt/slides/slide8.xml><?xml version="1.0" encoding="utf-8"?>
 <p:sld xmlns:a="http://schemas.openxmlformats.org/drawingml/2006/main" xmlns:r="http://schemas.openxmlformats.org/officeDocument/2006/relationships" xmlns:p="http://schemas.openxmlformats.org/presentationml/2006/main">
   <p:cSld>
     <p:spTree>
@@ -3572,7 +3694,7 @@
 </p:sld>
 </file>
 
-<file path=ppt/slides/slide8.xml><?xml version="1.0" encoding="utf-8"?>
+<file path=ppt/slides/slide9.xml><?xml version="1.0" encoding="utf-8"?>
 <p:sld xmlns:a="http://schemas.openxmlformats.org/drawingml/2006/main" xmlns:r="http://schemas.openxmlformats.org/officeDocument/2006/relationships" xmlns:p="http://schemas.openxmlformats.org/presentationml/2006/main">
   <p:cSld>
     <p:spTree>

</xml_diff>

<commit_message>
change England min age of estimates to 12 add key parameters to QA ppt
</commit_message>
<xml_diff>
--- a/transition_probability_estimates/smoking_transitions_England.pptx
+++ b/transition_probability_estimates/smoking_transitions_England.pptx
@@ -14,6 +14,7 @@
     <p:sldId id="262" r:id="rId8"/>
     <p:sldId id="263" r:id="rId9"/>
     <p:sldId id="264" r:id="rId10"/>
+    <p:sldId id="265" r:id="rId11"/>
   </p:sldIdLst>
   <p:sldSz cx="9144000" cy="5143500" type="screen16x9"/>
   <p:notesSz cx="6858000" cy="9144000"/>
@@ -3176,11 +3177,63 @@
             </a:pPr>
             <a:r>
               <a:rPr/>
-              <a:t>26 October 2023</a:t>
-            </a:r>
-          </a:p>
-        </p:txBody>
-      </p:sp>
+              <a:t>01 November 2023</a:t>
+            </a:r>
+          </a:p>
+        </p:txBody>
+      </p:sp>
+    </p:spTree>
+  </p:cSld>
+</p:sld>
+</file>
+
+<file path=ppt/slides/slide10.xml><?xml version="1.0" encoding="utf-8"?>
+<p:sld xmlns:a="http://schemas.openxmlformats.org/drawingml/2006/main" xmlns:r="http://schemas.openxmlformats.org/officeDocument/2006/relationships" xmlns:p="http://schemas.openxmlformats.org/presentationml/2006/main">
+  <p:cSld>
+    <p:spTree>
+      <p:nvGrpSpPr>
+        <p:cNvPr id="1" name=""/>
+        <p:cNvGrpSpPr/>
+        <p:nvPr/>
+      </p:nvGrpSpPr>
+      <p:grpSpPr>
+        <a:xfrm>
+          <a:off x="0" y="0"/>
+          <a:ext cx="0" cy="0"/>
+          <a:chOff x="0" y="0"/>
+          <a:chExt cx="0" cy="0"/>
+        </a:xfrm>
+      </p:grpSpPr>
+      <p:pic>
+        <p:nvPicPr>
+          <p:cNvPr descr="src_england/outputs/quit_probabilities_age.png" id="0" name="Picture 1"/>
+          <p:cNvPicPr>
+            <a:picLocks noGrp="1" noChangeAspect="1"/>
+          </p:cNvPicPr>
+          <p:nvPr/>
+        </p:nvPicPr>
+        <p:blipFill>
+          <a:blip r:embed="rId2"/>
+          <a:stretch>
+            <a:fillRect/>
+          </a:stretch>
+        </p:blipFill>
+        <p:spPr bwMode="auto">
+          <a:xfrm>
+            <a:off x="914400" y="1193800"/>
+            <a:ext cx="7302500" cy="3390900"/>
+          </a:xfrm>
+          <a:prstGeom prst="rect">
+            <a:avLst/>
+          </a:prstGeom>
+          <a:noFill/>
+          <a:ln w="9525">
+            <a:noFill/>
+            <a:headEnd/>
+            <a:tailEnd/>
+          </a:ln>
+        </p:spPr>
+      </p:pic>
     </p:spTree>
   </p:cSld>
 </p:sld>
@@ -3308,6 +3361,161 @@
 </file>
 
 <file path=ppt/slides/slide3.xml><?xml version="1.0" encoding="utf-8"?>
+<p:sld xmlns:a="http://schemas.openxmlformats.org/drawingml/2006/main" xmlns:r="http://schemas.openxmlformats.org/officeDocument/2006/relationships" xmlns:p="http://schemas.openxmlformats.org/presentationml/2006/main">
+  <p:cSld>
+    <p:spTree>
+      <p:nvGrpSpPr>
+        <p:cNvPr id="1" name=""/>
+        <p:cNvGrpSpPr/>
+        <p:nvPr/>
+      </p:nvGrpSpPr>
+      <p:grpSpPr>
+        <a:xfrm>
+          <a:off x="0" y="0"/>
+          <a:ext cx="0" cy="0"/>
+          <a:chOff x="0" y="0"/>
+          <a:chExt cx="0" cy="0"/>
+        </a:xfrm>
+      </p:grpSpPr>
+      <p:sp>
+        <p:nvSpPr>
+          <p:cNvPr id="2" name="Title 1"/>
+          <p:cNvSpPr>
+            <a:spLocks noGrp="1"/>
+          </p:cNvSpPr>
+          <p:nvPr>
+            <p:ph type="title"/>
+          </p:nvPr>
+        </p:nvSpPr>
+        <p:spPr/>
+        <p:txBody>
+          <a:bodyPr/>
+          <a:lstStyle/>
+          <a:p>
+            <a:pPr lvl="0" indent="0" marL="0">
+              <a:buNone/>
+            </a:pPr>
+            <a:r>
+              <a:rPr/>
+              <a:t>Key parameters</a:t>
+            </a:r>
+          </a:p>
+        </p:txBody>
+      </p:sp>
+      <p:sp>
+        <p:nvSpPr>
+          <p:cNvPr id="3" name="Content Placeholder 2"/>
+          <p:cNvSpPr>
+            <a:spLocks noGrp="1"/>
+          </p:cNvSpPr>
+          <p:nvPr>
+            <p:ph idx="1"/>
+          </p:nvPr>
+        </p:nvSpPr>
+        <p:spPr/>
+        <p:txBody>
+          <a:bodyPr/>
+          <a:lstStyle/>
+          <a:p>
+            <a:pPr lvl="0" indent="0" marL="0">
+              <a:buNone/>
+            </a:pPr>
+            <a:r>
+              <a:rPr/>
+              <a:t>Main dataset: </a:t>
+            </a:r>
+            <a:r>
+              <a:rPr>
+                <a:latin typeface="Courier"/>
+              </a:rPr>
+              <a:t>Health Survey for England</a:t>
+            </a:r>
+            <a:br/>
+            <a:r>
+              <a:rPr/>
+              <a:t>First year of survey data: </a:t>
+            </a:r>
+            <a:r>
+              <a:rPr>
+                <a:latin typeface="Courier"/>
+              </a:rPr>
+              <a:t>2003</a:t>
+            </a:r>
+            <a:br/>
+            <a:r>
+              <a:rPr/>
+              <a:t>Last year of survey data: </a:t>
+            </a:r>
+            <a:r>
+              <a:rPr>
+                <a:latin typeface="Courier"/>
+              </a:rPr>
+              <a:t>2018</a:t>
+            </a:r>
+            <a:br/>
+            <a:r>
+              <a:rPr/>
+              <a:t>Earliest year on which forecast trends are based: </a:t>
+            </a:r>
+            <a:r>
+              <a:rPr>
+                <a:latin typeface="Courier"/>
+              </a:rPr>
+              <a:t>2013</a:t>
+            </a:r>
+            <a:br/>
+            <a:r>
+              <a:rPr/>
+              <a:t>Last year of continuing trends in the forecast: </a:t>
+            </a:r>
+            <a:r>
+              <a:rPr>
+                <a:latin typeface="Courier"/>
+              </a:rPr>
+              <a:t>2040</a:t>
+            </a:r>
+            <a:br/>
+            <a:r>
+              <a:rPr/>
+              <a:t>Final year: </a:t>
+            </a:r>
+            <a:r>
+              <a:rPr>
+                <a:latin typeface="Courier"/>
+              </a:rPr>
+              <a:t>2100</a:t>
+            </a:r>
+            <a:br/>
+            <a:r>
+              <a:rPr/>
+              <a:t>Minimum age: </a:t>
+            </a:r>
+            <a:r>
+              <a:rPr>
+                <a:latin typeface="Courier"/>
+              </a:rPr>
+              <a:t>12</a:t>
+            </a:r>
+            <a:br/>
+            <a:r>
+              <a:rPr/>
+              <a:t>Maximum age: </a:t>
+            </a:r>
+            <a:r>
+              <a:rPr>
+                <a:latin typeface="Courier"/>
+              </a:rPr>
+              <a:t>89</a:t>
+            </a:r>
+          </a:p>
+        </p:txBody>
+      </p:sp>
+    </p:spTree>
+  </p:cSld>
+</p:sld>
+</file>
+
+<file path=ppt/slides/slide4.xml><?xml version="1.0" encoding="utf-8"?>
 <p:sld xmlns:a="http://schemas.openxmlformats.org/drawingml/2006/main" xmlns:r="http://schemas.openxmlformats.org/officeDocument/2006/relationships" xmlns:p="http://schemas.openxmlformats.org/presentationml/2006/main">
   <p:cSld>
     <p:spTree>
@@ -3384,7 +3592,7 @@
 </p:sld>
 </file>
 
-<file path=ppt/slides/slide4.xml><?xml version="1.0" encoding="utf-8"?>
+<file path=ppt/slides/slide5.xml><?xml version="1.0" encoding="utf-8"?>
 <p:sld xmlns:a="http://schemas.openxmlformats.org/drawingml/2006/main" xmlns:r="http://schemas.openxmlformats.org/officeDocument/2006/relationships" xmlns:p="http://schemas.openxmlformats.org/presentationml/2006/main">
   <p:cSld>
     <p:spTree>
@@ -3436,7 +3644,7 @@
 </p:sld>
 </file>
 
-<file path=ppt/slides/slide5.xml><?xml version="1.0" encoding="utf-8"?>
+<file path=ppt/slides/slide6.xml><?xml version="1.0" encoding="utf-8"?>
 <p:sld xmlns:a="http://schemas.openxmlformats.org/drawingml/2006/main" xmlns:r="http://schemas.openxmlformats.org/officeDocument/2006/relationships" xmlns:p="http://schemas.openxmlformats.org/presentationml/2006/main">
   <p:cSld>
     <p:spTree>
@@ -3513,7 +3721,7 @@
 </p:sld>
 </file>
 
-<file path=ppt/slides/slide6.xml><?xml version="1.0" encoding="utf-8"?>
+<file path=ppt/slides/slide7.xml><?xml version="1.0" encoding="utf-8"?>
 <p:sld xmlns:a="http://schemas.openxmlformats.org/drawingml/2006/main" xmlns:r="http://schemas.openxmlformats.org/officeDocument/2006/relationships" xmlns:p="http://schemas.openxmlformats.org/presentationml/2006/main">
   <p:cSld>
     <p:spTree>
@@ -3565,7 +3773,7 @@
 </p:sld>
 </file>
 
-<file path=ppt/slides/slide7.xml><?xml version="1.0" encoding="utf-8"?>
+<file path=ppt/slides/slide8.xml><?xml version="1.0" encoding="utf-8"?>
 <p:sld xmlns:a="http://schemas.openxmlformats.org/drawingml/2006/main" xmlns:r="http://schemas.openxmlformats.org/officeDocument/2006/relationships" xmlns:p="http://schemas.openxmlformats.org/presentationml/2006/main">
   <p:cSld>
     <p:spTree>
@@ -3617,83 +3825,6 @@
 </p:sld>
 </file>
 
-<file path=ppt/slides/slide8.xml><?xml version="1.0" encoding="utf-8"?>
-<p:sld xmlns:a="http://schemas.openxmlformats.org/drawingml/2006/main" xmlns:r="http://schemas.openxmlformats.org/officeDocument/2006/relationships" xmlns:p="http://schemas.openxmlformats.org/presentationml/2006/main">
-  <p:cSld>
-    <p:spTree>
-      <p:nvGrpSpPr>
-        <p:cNvPr id="1" name=""/>
-        <p:cNvGrpSpPr/>
-        <p:nvPr/>
-      </p:nvGrpSpPr>
-      <p:grpSpPr>
-        <a:xfrm>
-          <a:off x="0" y="0"/>
-          <a:ext cx="0" cy="0"/>
-          <a:chOff x="0" y="0"/>
-          <a:chExt cx="0" cy="0"/>
-        </a:xfrm>
-      </p:grpSpPr>
-      <p:sp>
-        <p:nvSpPr>
-          <p:cNvPr id="2" name="Title 1"/>
-          <p:cNvSpPr>
-            <a:spLocks noGrp="1"/>
-          </p:cNvSpPr>
-          <p:nvPr>
-            <p:ph type="title"/>
-          </p:nvPr>
-        </p:nvSpPr>
-        <p:spPr/>
-        <p:txBody>
-          <a:bodyPr/>
-          <a:lstStyle/>
-          <a:p>
-            <a:pPr lvl="0" indent="0" marL="0">
-              <a:buNone/>
-            </a:pPr>
-            <a:r>
-              <a:rPr/>
-              <a:t>Quitting</a:t>
-            </a:r>
-          </a:p>
-        </p:txBody>
-      </p:sp>
-      <p:pic>
-        <p:nvPicPr>
-          <p:cNvPr descr="src_england/outputs/quitting_probabilities_av.png" id="0" name="Picture 1"/>
-          <p:cNvPicPr>
-            <a:picLocks noGrp="1" noChangeAspect="1"/>
-          </p:cNvPicPr>
-          <p:nvPr/>
-        </p:nvPicPr>
-        <p:blipFill>
-          <a:blip r:embed="rId2"/>
-          <a:stretch>
-            <a:fillRect/>
-          </a:stretch>
-        </p:blipFill>
-        <p:spPr bwMode="auto">
-          <a:xfrm>
-            <a:off x="914400" y="1193800"/>
-            <a:ext cx="7302500" cy="3390900"/>
-          </a:xfrm>
-          <a:prstGeom prst="rect">
-            <a:avLst/>
-          </a:prstGeom>
-          <a:noFill/>
-          <a:ln w="9525">
-            <a:noFill/>
-            <a:headEnd/>
-            <a:tailEnd/>
-          </a:ln>
-        </p:spPr>
-      </p:pic>
-    </p:spTree>
-  </p:cSld>
-</p:sld>
-</file>
-
 <file path=ppt/slides/slide9.xml><?xml version="1.0" encoding="utf-8"?>
 <p:sld xmlns:a="http://schemas.openxmlformats.org/drawingml/2006/main" xmlns:r="http://schemas.openxmlformats.org/officeDocument/2006/relationships" xmlns:p="http://schemas.openxmlformats.org/presentationml/2006/main">
   <p:cSld>
@@ -3711,9 +3842,34 @@
           <a:chExt cx="0" cy="0"/>
         </a:xfrm>
       </p:grpSpPr>
+      <p:sp>
+        <p:nvSpPr>
+          <p:cNvPr id="2" name="Title 1"/>
+          <p:cNvSpPr>
+            <a:spLocks noGrp="1"/>
+          </p:cNvSpPr>
+          <p:nvPr>
+            <p:ph type="title"/>
+          </p:nvPr>
+        </p:nvSpPr>
+        <p:spPr/>
+        <p:txBody>
+          <a:bodyPr/>
+          <a:lstStyle/>
+          <a:p>
+            <a:pPr lvl="0" indent="0" marL="0">
+              <a:buNone/>
+            </a:pPr>
+            <a:r>
+              <a:rPr/>
+              <a:t>Quitting</a:t>
+            </a:r>
+          </a:p>
+        </p:txBody>
+      </p:sp>
       <p:pic>
         <p:nvPicPr>
-          <p:cNvPr descr="src_england/outputs/quit_probabilities_age.png" id="0" name="Picture 1"/>
+          <p:cNvPr descr="src_england/outputs/quitting_probabilities_av.png" id="0" name="Picture 1"/>
           <p:cNvPicPr>
             <a:picLocks noGrp="1" noChangeAspect="1"/>
           </p:cNvPicPr>

</xml_diff>